<commit_message>
updated for 2023_3 delivery
</commit_message>
<xml_diff>
--- a/Introduction/Lecture.pptx
+++ b/Introduction/Lecture.pptx
@@ -16,7 +16,6 @@
     <p:sldId id="260" r:id="rId9"/>
     <p:sldId id="261" r:id="rId10"/>
     <p:sldId id="262" r:id="rId11"/>
-    <p:sldId id="263" r:id="rId12"/>
   </p:sldIdLst>
   <p:sldSz cx="9144000" cy="6858000"/>
   <p:notesSz cx="6858000" cy="9144000"/>
@@ -247,7 +246,7 @@
           </a:bodyPr>
           <a:p>
             <a:pPr algn="r"/>
-            <a:fld id="{DF9860CB-4478-49D0-B7D9-8FD32604811C}" type="slidenum">
+            <a:fld id="{7368CFC8-ECA1-450C-B160-3FFE370F6F92}" type="slidenum">
               <a:rPr b="0" lang="en-CA" sz="1400" spc="-1" strike="noStrike">
                 <a:latin typeface="Times New Roman"/>
               </a:rPr>
@@ -284,14 +283,14 @@
       </p:grpSpPr>
       <p:sp>
         <p:nvSpPr>
-          <p:cNvPr id="101" name="CustomShape 1"/>
+          <p:cNvPr id="99" name="CustomShape 1"/>
           <p:cNvSpPr/>
           <p:nvPr/>
         </p:nvSpPr>
         <p:spPr>
           <a:xfrm>
             <a:off x="3884760" y="8685360"/>
-            <a:ext cx="2971080" cy="456480"/>
+            <a:ext cx="2970360" cy="455760"/>
           </a:xfrm>
           <a:prstGeom prst="rect">
             <a:avLst/>
@@ -317,8 +316,11 @@
                 <a:spcPct val="100000"/>
               </a:lnSpc>
             </a:pPr>
-            <a:fld id="{FAA011BD-9610-4CBD-B3F0-352FB2A70E67}" type="slidenum">
+            <a:fld id="{270F42BF-6D1C-4450-B3E6-1E905C4266DE}" type="slidenum">
               <a:rPr b="0" lang="en-US" sz="1200" spc="-1" strike="noStrike">
+                <a:solidFill>
+                  <a:srgbClr val="000000"/>
+                </a:solidFill>
                 <a:latin typeface="Times New Roman"/>
                 <a:ea typeface="Lucida Sans Unicode"/>
               </a:rPr>
@@ -332,7 +334,7 @@
       </p:sp>
       <p:sp>
         <p:nvSpPr>
-          <p:cNvPr id="102" name="PlaceHolder 2"/>
+          <p:cNvPr id="100" name="PlaceHolder 2"/>
           <p:cNvSpPr>
             <a:spLocks noGrp="1"/>
           </p:cNvSpPr>
@@ -343,16 +345,16 @@
         <p:spPr>
           <a:xfrm>
             <a:off x="1143000" y="685800"/>
-            <a:ext cx="4571280" cy="3428280"/>
-          </a:xfrm>
-          <a:prstGeom prst="rect">
-            <a:avLst/>
-          </a:prstGeom>
-        </p:spPr>
-      </p:sp>
-      <p:sp>
-        <p:nvSpPr>
-          <p:cNvPr id="103" name="PlaceHolder 3"/>
+            <a:ext cx="4570560" cy="3427560"/>
+          </a:xfrm>
+          <a:prstGeom prst="rect">
+            <a:avLst/>
+          </a:prstGeom>
+        </p:spPr>
+      </p:sp>
+      <p:sp>
+        <p:nvSpPr>
+          <p:cNvPr id="101" name="PlaceHolder 3"/>
           <p:cNvSpPr>
             <a:spLocks noGrp="1"/>
           </p:cNvSpPr>
@@ -363,7 +365,7 @@
         <p:spPr>
           <a:xfrm>
             <a:off x="685800" y="4343400"/>
-            <a:ext cx="5485680" cy="4114080"/>
+            <a:ext cx="5484960" cy="4113360"/>
           </a:xfrm>
           <a:prstGeom prst="rect">
             <a:avLst/>
@@ -404,14 +406,14 @@
       </p:grpSpPr>
       <p:sp>
         <p:nvSpPr>
-          <p:cNvPr id="104" name="CustomShape 1"/>
+          <p:cNvPr id="102" name="CustomShape 1"/>
           <p:cNvSpPr/>
           <p:nvPr/>
         </p:nvSpPr>
         <p:spPr>
           <a:xfrm>
             <a:off x="3884760" y="8685360"/>
-            <a:ext cx="2971080" cy="456480"/>
+            <a:ext cx="2970360" cy="455760"/>
           </a:xfrm>
           <a:prstGeom prst="rect">
             <a:avLst/>
@@ -437,8 +439,11 @@
                 <a:spcPct val="100000"/>
               </a:lnSpc>
             </a:pPr>
-            <a:fld id="{76E59792-F906-4FEB-9403-449A947CA169}" type="slidenum">
+            <a:fld id="{FE71E861-B6CC-4EF9-99C2-8C267DFD6861}" type="slidenum">
               <a:rPr b="0" lang="en-US" sz="1200" spc="-1" strike="noStrike">
+                <a:solidFill>
+                  <a:srgbClr val="000000"/>
+                </a:solidFill>
                 <a:latin typeface="Times New Roman"/>
                 <a:ea typeface="Lucida Sans Unicode"/>
               </a:rPr>
@@ -452,7 +457,7 @@
       </p:sp>
       <p:sp>
         <p:nvSpPr>
-          <p:cNvPr id="105" name="PlaceHolder 2"/>
+          <p:cNvPr id="103" name="PlaceHolder 2"/>
           <p:cNvSpPr>
             <a:spLocks noGrp="1"/>
           </p:cNvSpPr>
@@ -463,16 +468,16 @@
         <p:spPr>
           <a:xfrm>
             <a:off x="1143000" y="685800"/>
-            <a:ext cx="4571280" cy="3428280"/>
-          </a:xfrm>
-          <a:prstGeom prst="rect">
-            <a:avLst/>
-          </a:prstGeom>
-        </p:spPr>
-      </p:sp>
-      <p:sp>
-        <p:nvSpPr>
-          <p:cNvPr id="106" name="PlaceHolder 3"/>
+            <a:ext cx="4570560" cy="3427560"/>
+          </a:xfrm>
+          <a:prstGeom prst="rect">
+            <a:avLst/>
+          </a:prstGeom>
+        </p:spPr>
+      </p:sp>
+      <p:sp>
+        <p:nvSpPr>
+          <p:cNvPr id="104" name="PlaceHolder 3"/>
           <p:cNvSpPr>
             <a:spLocks noGrp="1"/>
           </p:cNvSpPr>
@@ -483,7 +488,7 @@
         <p:spPr>
           <a:xfrm>
             <a:off x="685800" y="4343400"/>
-            <a:ext cx="5485680" cy="4114080"/>
+            <a:ext cx="5484960" cy="4113360"/>
           </a:xfrm>
           <a:prstGeom prst="rect">
             <a:avLst/>
@@ -524,14 +529,14 @@
       </p:grpSpPr>
       <p:sp>
         <p:nvSpPr>
-          <p:cNvPr id="107" name="CustomShape 1"/>
+          <p:cNvPr id="105" name="CustomShape 1"/>
           <p:cNvSpPr/>
           <p:nvPr/>
         </p:nvSpPr>
         <p:spPr>
           <a:xfrm>
             <a:off x="3884760" y="8685360"/>
-            <a:ext cx="2971080" cy="456480"/>
+            <a:ext cx="2970360" cy="455760"/>
           </a:xfrm>
           <a:prstGeom prst="rect">
             <a:avLst/>
@@ -557,8 +562,11 @@
                 <a:spcPct val="100000"/>
               </a:lnSpc>
             </a:pPr>
-            <a:fld id="{0D47E349-7501-4D52-9A7D-9A00C6814818}" type="slidenum">
+            <a:fld id="{F5078E5B-7293-48A2-B01B-B363D9E911A8}" type="slidenum">
               <a:rPr b="0" lang="en-US" sz="1200" spc="-1" strike="noStrike">
+                <a:solidFill>
+                  <a:srgbClr val="000000"/>
+                </a:solidFill>
                 <a:latin typeface="Times New Roman"/>
                 <a:ea typeface="Lucida Sans Unicode"/>
               </a:rPr>
@@ -572,7 +580,7 @@
       </p:sp>
       <p:sp>
         <p:nvSpPr>
-          <p:cNvPr id="108" name="PlaceHolder 2"/>
+          <p:cNvPr id="106" name="PlaceHolder 2"/>
           <p:cNvSpPr>
             <a:spLocks noGrp="1"/>
           </p:cNvSpPr>
@@ -583,16 +591,16 @@
         <p:spPr>
           <a:xfrm>
             <a:off x="1143000" y="685800"/>
-            <a:ext cx="4571280" cy="3428280"/>
-          </a:xfrm>
-          <a:prstGeom prst="rect">
-            <a:avLst/>
-          </a:prstGeom>
-        </p:spPr>
-      </p:sp>
-      <p:sp>
-        <p:nvSpPr>
-          <p:cNvPr id="109" name="PlaceHolder 3"/>
+            <a:ext cx="4570560" cy="3427560"/>
+          </a:xfrm>
+          <a:prstGeom prst="rect">
+            <a:avLst/>
+          </a:prstGeom>
+        </p:spPr>
+      </p:sp>
+      <p:sp>
+        <p:nvSpPr>
+          <p:cNvPr id="107" name="PlaceHolder 3"/>
           <p:cNvSpPr>
             <a:spLocks noGrp="1"/>
           </p:cNvSpPr>
@@ -603,7 +611,7 @@
         <p:spPr>
           <a:xfrm>
             <a:off x="685800" y="4343400"/>
-            <a:ext cx="5485680" cy="4114080"/>
+            <a:ext cx="5484960" cy="4113360"/>
           </a:xfrm>
           <a:prstGeom prst="rect">
             <a:avLst/>
@@ -644,14 +652,14 @@
       </p:grpSpPr>
       <p:sp>
         <p:nvSpPr>
-          <p:cNvPr id="110" name="CustomShape 1"/>
+          <p:cNvPr id="108" name="CustomShape 1"/>
           <p:cNvSpPr/>
           <p:nvPr/>
         </p:nvSpPr>
         <p:spPr>
           <a:xfrm>
             <a:off x="3884760" y="8685360"/>
-            <a:ext cx="2971080" cy="456480"/>
+            <a:ext cx="2970360" cy="455760"/>
           </a:xfrm>
           <a:prstGeom prst="rect">
             <a:avLst/>
@@ -677,8 +685,11 @@
                 <a:spcPct val="100000"/>
               </a:lnSpc>
             </a:pPr>
-            <a:fld id="{02E039FB-92FE-489D-8181-564A40519928}" type="slidenum">
+            <a:fld id="{106F1AAC-C3AD-4F63-AECE-9120635951B6}" type="slidenum">
               <a:rPr b="0" lang="en-US" sz="1200" spc="-1" strike="noStrike">
+                <a:solidFill>
+                  <a:srgbClr val="000000"/>
+                </a:solidFill>
                 <a:latin typeface="Times New Roman"/>
                 <a:ea typeface="Lucida Sans Unicode"/>
               </a:rPr>
@@ -692,7 +703,7 @@
       </p:sp>
       <p:sp>
         <p:nvSpPr>
-          <p:cNvPr id="111" name="PlaceHolder 2"/>
+          <p:cNvPr id="109" name="PlaceHolder 2"/>
           <p:cNvSpPr>
             <a:spLocks noGrp="1"/>
           </p:cNvSpPr>
@@ -703,16 +714,16 @@
         <p:spPr>
           <a:xfrm>
             <a:off x="1143000" y="685800"/>
-            <a:ext cx="4571280" cy="3428280"/>
-          </a:xfrm>
-          <a:prstGeom prst="rect">
-            <a:avLst/>
-          </a:prstGeom>
-        </p:spPr>
-      </p:sp>
-      <p:sp>
-        <p:nvSpPr>
-          <p:cNvPr id="112" name="PlaceHolder 3"/>
+            <a:ext cx="4570560" cy="3427560"/>
+          </a:xfrm>
+          <a:prstGeom prst="rect">
+            <a:avLst/>
+          </a:prstGeom>
+        </p:spPr>
+      </p:sp>
+      <p:sp>
+        <p:nvSpPr>
+          <p:cNvPr id="110" name="PlaceHolder 3"/>
           <p:cNvSpPr>
             <a:spLocks noGrp="1"/>
           </p:cNvSpPr>
@@ -723,7 +734,7 @@
         <p:spPr>
           <a:xfrm>
             <a:off x="685800" y="4343400"/>
-            <a:ext cx="5485680" cy="4114080"/>
+            <a:ext cx="5484960" cy="4113360"/>
           </a:xfrm>
           <a:prstGeom prst="rect">
             <a:avLst/>
@@ -764,14 +775,14 @@
       </p:grpSpPr>
       <p:sp>
         <p:nvSpPr>
-          <p:cNvPr id="113" name="CustomShape 1"/>
+          <p:cNvPr id="111" name="CustomShape 1"/>
           <p:cNvSpPr/>
           <p:nvPr/>
         </p:nvSpPr>
         <p:spPr>
           <a:xfrm>
             <a:off x="3884760" y="8685360"/>
-            <a:ext cx="2971080" cy="456480"/>
+            <a:ext cx="2970360" cy="455760"/>
           </a:xfrm>
           <a:prstGeom prst="rect">
             <a:avLst/>
@@ -797,8 +808,11 @@
                 <a:spcPct val="100000"/>
               </a:lnSpc>
             </a:pPr>
-            <a:fld id="{29E31662-24DB-4672-89CC-44E7DD035B12}" type="slidenum">
+            <a:fld id="{20F84121-B392-469F-8245-E1C02E256BF6}" type="slidenum">
               <a:rPr b="0" lang="en-US" sz="1200" spc="-1" strike="noStrike">
+                <a:solidFill>
+                  <a:srgbClr val="000000"/>
+                </a:solidFill>
                 <a:latin typeface="Times New Roman"/>
                 <a:ea typeface="Lucida Sans Unicode"/>
               </a:rPr>
@@ -812,7 +826,7 @@
       </p:sp>
       <p:sp>
         <p:nvSpPr>
-          <p:cNvPr id="114" name="PlaceHolder 2"/>
+          <p:cNvPr id="112" name="PlaceHolder 2"/>
           <p:cNvSpPr>
             <a:spLocks noGrp="1"/>
           </p:cNvSpPr>
@@ -823,16 +837,16 @@
         <p:spPr>
           <a:xfrm>
             <a:off x="1143000" y="685800"/>
-            <a:ext cx="4571280" cy="3428280"/>
-          </a:xfrm>
-          <a:prstGeom prst="rect">
-            <a:avLst/>
-          </a:prstGeom>
-        </p:spPr>
-      </p:sp>
-      <p:sp>
-        <p:nvSpPr>
-          <p:cNvPr id="115" name="PlaceHolder 3"/>
+            <a:ext cx="4570560" cy="3427560"/>
+          </a:xfrm>
+          <a:prstGeom prst="rect">
+            <a:avLst/>
+          </a:prstGeom>
+        </p:spPr>
+      </p:sp>
+      <p:sp>
+        <p:nvSpPr>
+          <p:cNvPr id="113" name="PlaceHolder 3"/>
           <p:cNvSpPr>
             <a:spLocks noGrp="1"/>
           </p:cNvSpPr>
@@ -843,7 +857,7 @@
         <p:spPr>
           <a:xfrm>
             <a:off x="685800" y="4343400"/>
-            <a:ext cx="5485680" cy="4114080"/>
+            <a:ext cx="5484960" cy="4113360"/>
           </a:xfrm>
           <a:prstGeom prst="rect">
             <a:avLst/>
@@ -884,14 +898,14 @@
       </p:grpSpPr>
       <p:sp>
         <p:nvSpPr>
-          <p:cNvPr id="116" name="CustomShape 1"/>
+          <p:cNvPr id="114" name="CustomShape 1"/>
           <p:cNvSpPr/>
           <p:nvPr/>
         </p:nvSpPr>
         <p:spPr>
           <a:xfrm>
             <a:off x="3884760" y="8685360"/>
-            <a:ext cx="2971080" cy="456480"/>
+            <a:ext cx="2970360" cy="455760"/>
           </a:xfrm>
           <a:prstGeom prst="rect">
             <a:avLst/>
@@ -917,8 +931,11 @@
                 <a:spcPct val="100000"/>
               </a:lnSpc>
             </a:pPr>
-            <a:fld id="{71C00E6B-CF9E-4E1F-BC5E-BBDAD6E9124E}" type="slidenum">
+            <a:fld id="{AE7F6E36-5AC0-4578-B0C9-4036EF9B813D}" type="slidenum">
               <a:rPr b="0" lang="en-US" sz="1200" spc="-1" strike="noStrike">
+                <a:solidFill>
+                  <a:srgbClr val="000000"/>
+                </a:solidFill>
                 <a:latin typeface="Times New Roman"/>
                 <a:ea typeface="Lucida Sans Unicode"/>
               </a:rPr>
@@ -932,7 +949,7 @@
       </p:sp>
       <p:sp>
         <p:nvSpPr>
-          <p:cNvPr id="117" name="PlaceHolder 2"/>
+          <p:cNvPr id="115" name="PlaceHolder 2"/>
           <p:cNvSpPr>
             <a:spLocks noGrp="1"/>
           </p:cNvSpPr>
@@ -943,16 +960,16 @@
         <p:spPr>
           <a:xfrm>
             <a:off x="1143000" y="685800"/>
-            <a:ext cx="4571280" cy="3428280"/>
-          </a:xfrm>
-          <a:prstGeom prst="rect">
-            <a:avLst/>
-          </a:prstGeom>
-        </p:spPr>
-      </p:sp>
-      <p:sp>
-        <p:nvSpPr>
-          <p:cNvPr id="118" name="PlaceHolder 3"/>
+            <a:ext cx="4570560" cy="3427560"/>
+          </a:xfrm>
+          <a:prstGeom prst="rect">
+            <a:avLst/>
+          </a:prstGeom>
+        </p:spPr>
+      </p:sp>
+      <p:sp>
+        <p:nvSpPr>
+          <p:cNvPr id="116" name="PlaceHolder 3"/>
           <p:cNvSpPr>
             <a:spLocks noGrp="1"/>
           </p:cNvSpPr>
@@ -963,127 +980,7 @@
         <p:spPr>
           <a:xfrm>
             <a:off x="685800" y="4343400"/>
-            <a:ext cx="5485680" cy="4114080"/>
-          </a:xfrm>
-          <a:prstGeom prst="rect">
-            <a:avLst/>
-          </a:prstGeom>
-        </p:spPr>
-        <p:txBody>
-          <a:bodyPr lIns="0" rIns="0" tIns="0" bIns="0">
-            <a:noAutofit/>
-          </a:bodyPr>
-          <a:p>
-            <a:endParaRPr b="0" lang="en-CA" sz="2000" spc="-1" strike="noStrike">
-              <a:latin typeface="Arial"/>
-            </a:endParaRPr>
-          </a:p>
-        </p:txBody>
-      </p:sp>
-    </p:spTree>
-  </p:cSld>
-</p:notes>
-</file>
-
-<file path=ppt/notesSlides/notesSlide8.xml><?xml version="1.0" encoding="utf-8"?>
-<p:notes xmlns:a="http://schemas.openxmlformats.org/drawingml/2006/main" xmlns:p="http://schemas.openxmlformats.org/presentationml/2006/main" xmlns:r="http://schemas.openxmlformats.org/officeDocument/2006/relationships" xmlns:p14="http://schemas.microsoft.com/office/powerpoint/2010/main" xmlns:p15="http://schemas.microsoft.com/office/powerpoint/2012/main" xmlns:mc="http://schemas.openxmlformats.org/markup-compatibility/2006">
-  <p:cSld>
-    <p:spTree>
-      <p:nvGrpSpPr>
-        <p:cNvPr id="1" name=""/>
-        <p:cNvGrpSpPr/>
-        <p:nvPr/>
-      </p:nvGrpSpPr>
-      <p:grpSpPr>
-        <a:xfrm>
-          <a:off x="0" y="0"/>
-          <a:ext cx="0" cy="0"/>
-          <a:chOff x="0" y="0"/>
-          <a:chExt cx="0" cy="0"/>
-        </a:xfrm>
-      </p:grpSpPr>
-      <p:sp>
-        <p:nvSpPr>
-          <p:cNvPr id="119" name="CustomShape 1"/>
-          <p:cNvSpPr/>
-          <p:nvPr/>
-        </p:nvSpPr>
-        <p:spPr>
-          <a:xfrm>
-            <a:off x="3884760" y="8685360"/>
-            <a:ext cx="2971080" cy="456480"/>
-          </a:xfrm>
-          <a:prstGeom prst="rect">
-            <a:avLst/>
-          </a:prstGeom>
-          <a:noFill/>
-          <a:ln w="9360">
-            <a:noFill/>
-          </a:ln>
-        </p:spPr>
-        <p:style>
-          <a:lnRef idx="0"/>
-          <a:fillRef idx="0"/>
-          <a:effectRef idx="0"/>
-          <a:fontRef idx="minor"/>
-        </p:style>
-        <p:txBody>
-          <a:bodyPr lIns="90000" rIns="90000" tIns="45000" bIns="45000" anchor="b">
-            <a:noAutofit/>
-          </a:bodyPr>
-          <a:p>
-            <a:pPr>
-              <a:lnSpc>
-                <a:spcPct val="100000"/>
-              </a:lnSpc>
-            </a:pPr>
-            <a:fld id="{32D55D77-2201-40A4-B4C6-FB051D2BEBBB}" type="slidenum">
-              <a:rPr b="0" lang="en-US" sz="1200" spc="-1" strike="noStrike">
-                <a:latin typeface="Times New Roman"/>
-                <a:ea typeface="Lucida Sans Unicode"/>
-              </a:rPr>
-              <a:t>&lt;number&gt;</a:t>
-            </a:fld>
-            <a:endParaRPr b="0" lang="en-CA" sz="1200" spc="-1" strike="noStrike">
-              <a:latin typeface="Arial"/>
-            </a:endParaRPr>
-          </a:p>
-        </p:txBody>
-      </p:sp>
-      <p:sp>
-        <p:nvSpPr>
-          <p:cNvPr id="120" name="PlaceHolder 2"/>
-          <p:cNvSpPr>
-            <a:spLocks noGrp="1"/>
-          </p:cNvSpPr>
-          <p:nvPr>
-            <p:ph type="sldImg"/>
-          </p:nvPr>
-        </p:nvSpPr>
-        <p:spPr>
-          <a:xfrm>
-            <a:off x="1143000" y="685800"/>
-            <a:ext cx="4571280" cy="3428280"/>
-          </a:xfrm>
-          <a:prstGeom prst="rect">
-            <a:avLst/>
-          </a:prstGeom>
-        </p:spPr>
-      </p:sp>
-      <p:sp>
-        <p:nvSpPr>
-          <p:cNvPr id="121" name="PlaceHolder 3"/>
-          <p:cNvSpPr>
-            <a:spLocks noGrp="1"/>
-          </p:cNvSpPr>
-          <p:nvPr>
-            <p:ph type="body"/>
-          </p:nvPr>
-        </p:nvSpPr>
-        <p:spPr>
-          <a:xfrm>
-            <a:off x="685800" y="4343400"/>
-            <a:ext cx="5485680" cy="4114080"/>
+            <a:ext cx="5484960" cy="4113360"/>
           </a:xfrm>
           <a:prstGeom prst="rect">
             <a:avLst/>
@@ -3854,7 +3751,7 @@
         <p:spPr>
           <a:xfrm>
             <a:off x="35640" y="6099120"/>
-            <a:ext cx="2532960" cy="713520"/>
+            <a:ext cx="2532240" cy="712800"/>
           </a:xfrm>
           <a:prstGeom prst="rect">
             <a:avLst/>
@@ -3876,8 +3773,8 @@
         </p:nvSpPr>
         <p:spPr>
           <a:xfrm>
-            <a:off x="457200" y="274680"/>
-            <a:ext cx="8228880" cy="1142280"/>
+            <a:off x="457200" y="273600"/>
+            <a:ext cx="8229240" cy="1144800"/>
           </a:xfrm>
           <a:prstGeom prst="rect">
             <a:avLst/>
@@ -3888,13 +3785,14 @@
             <a:noAutofit/>
           </a:bodyPr>
           <a:p>
+            <a:pPr algn="ctr"/>
             <a:r>
-              <a:rPr b="0" lang="en-CA" sz="1800" spc="-1" strike="noStrike">
+              <a:rPr b="0" lang="en-CA" sz="4400" spc="-1" strike="noStrike">
                 <a:latin typeface="Arial"/>
               </a:rPr>
               <a:t>Click to edit the title text format</a:t>
             </a:r>
-            <a:endParaRPr b="0" lang="en-CA" sz="1800" spc="-1" strike="noStrike">
+            <a:endParaRPr b="0" lang="en-CA" sz="4400" spc="-1" strike="noStrike">
               <a:latin typeface="Arial"/>
             </a:endParaRPr>
           </a:p>
@@ -4136,7 +4034,7 @@
         <p:spPr>
           <a:xfrm>
             <a:off x="35640" y="6099120"/>
-            <a:ext cx="2532960" cy="713520"/>
+            <a:ext cx="2532240" cy="712800"/>
           </a:xfrm>
           <a:prstGeom prst="rect">
             <a:avLst/>
@@ -4408,7 +4306,7 @@
         <p:spPr>
           <a:xfrm>
             <a:off x="685800" y="2130480"/>
-            <a:ext cx="7771680" cy="1469160"/>
+            <a:ext cx="7770960" cy="1468440"/>
           </a:xfrm>
           <a:prstGeom prst="rect">
             <a:avLst/>
@@ -4459,7 +4357,7 @@
         <p:spPr>
           <a:xfrm>
             <a:off x="1371600" y="3886200"/>
-            <a:ext cx="6400080" cy="1751760"/>
+            <a:ext cx="6399360" cy="1751040"/>
           </a:xfrm>
           <a:prstGeom prst="rect">
             <a:avLst/>
@@ -4515,7 +4413,7 @@
         <p:spPr>
           <a:xfrm>
             <a:off x="457200" y="274680"/>
-            <a:ext cx="8228880" cy="1142280"/>
+            <a:ext cx="8228160" cy="1141560"/>
           </a:xfrm>
           <a:prstGeom prst="rect">
             <a:avLst/>
@@ -4566,7 +4464,7 @@
         <p:spPr>
           <a:xfrm>
             <a:off x="457200" y="1600200"/>
-            <a:ext cx="8228880" cy="2056680"/>
+            <a:ext cx="8228160" cy="2055960"/>
           </a:xfrm>
           <a:prstGeom prst="rect">
             <a:avLst/>
@@ -4587,7 +4485,7 @@
             <a:noAutofit/>
           </a:bodyPr>
           <a:p>
-            <a:pPr marL="343080" indent="-342360">
+            <a:pPr marL="343080" indent="-341640">
               <a:lnSpc>
                 <a:spcPct val="100000"/>
               </a:lnSpc>
@@ -4615,7 +4513,7 @@
             </a:endParaRPr>
           </a:p>
           <a:p>
-            <a:pPr marL="343080" indent="-342360">
+            <a:pPr marL="343080" indent="-341640">
               <a:lnSpc>
                 <a:spcPct val="100000"/>
               </a:lnSpc>
@@ -4653,7 +4551,7 @@
         <p:spPr>
           <a:xfrm>
             <a:off x="1787040" y="5715000"/>
-            <a:ext cx="5406480" cy="303120"/>
+            <a:ext cx="5405760" cy="302760"/>
           </a:xfrm>
           <a:prstGeom prst="rect">
             <a:avLst/>
@@ -4734,7 +4632,7 @@
         <p:spPr>
           <a:xfrm>
             <a:off x="457200" y="274680"/>
-            <a:ext cx="8228880" cy="1142280"/>
+            <a:ext cx="8228160" cy="1141560"/>
           </a:xfrm>
           <a:prstGeom prst="rect">
             <a:avLst/>
@@ -4785,7 +4683,7 @@
         <p:spPr>
           <a:xfrm>
             <a:off x="609480" y="1295280"/>
-            <a:ext cx="7771680" cy="3504600"/>
+            <a:ext cx="7770960" cy="3503880"/>
           </a:xfrm>
           <a:prstGeom prst="rect">
             <a:avLst/>
@@ -4956,7 +4854,7 @@
         <p:spPr>
           <a:xfrm>
             <a:off x="457200" y="274680"/>
-            <a:ext cx="8228880" cy="1142280"/>
+            <a:ext cx="8228160" cy="1141560"/>
           </a:xfrm>
           <a:prstGeom prst="rect">
             <a:avLst/>
@@ -5006,8 +4904,8 @@
         </p:nvSpPr>
         <p:spPr>
           <a:xfrm>
-            <a:off x="1066680" y="1296000"/>
-            <a:ext cx="7619400" cy="3276000"/>
+            <a:off x="805320" y="1260720"/>
+            <a:ext cx="7618680" cy="3275280"/>
           </a:xfrm>
           <a:prstGeom prst="rect">
             <a:avLst/>
@@ -5028,7 +4926,7 @@
             <a:noAutofit/>
           </a:bodyPr>
           <a:p>
-            <a:pPr marL="343080" indent="-342360">
+            <a:pPr marL="343080" indent="-341640">
               <a:lnSpc>
                 <a:spcPct val="150000"/>
               </a:lnSpc>
@@ -5042,79 +4940,21 @@
               <a:buChar char=""/>
             </a:pPr>
             <a:r>
-              <a:rPr b="1" lang="en-US" sz="2000" spc="-1" strike="noStrike">
+              <a:rPr b="0" lang="en-US" sz="2000" spc="-1" strike="noStrike">
                 <a:solidFill>
                   <a:srgbClr val="000000"/>
                 </a:solidFill>
-                <a:latin typeface="Calibri"/>
+                <a:latin typeface="FreeSerif"/>
                 <a:ea typeface="ＭＳ Ｐゴシック"/>
               </a:rPr>
-              <a:t>Mix of distro’s:</a:t>
+              <a:t>It is each student’s responsibility to manage their own lab environment. </a:t>
             </a:r>
             <a:endParaRPr b="0" lang="en-CA" sz="2000" spc="-1" strike="noStrike">
               <a:latin typeface="Arial"/>
             </a:endParaRPr>
           </a:p>
           <a:p>
-            <a:pPr lvl="3" marL="864000" indent="-216000">
-              <a:lnSpc>
-                <a:spcPct val="150000"/>
-              </a:lnSpc>
-              <a:spcBef>
-                <a:spcPts val="479"/>
-              </a:spcBef>
-              <a:buClr>
-                <a:srgbClr val="000000"/>
-              </a:buClr>
-              <a:buSzPct val="45000"/>
-              <a:buFont typeface="Wingdings" charset="2"/>
-              <a:buChar char=""/>
-            </a:pPr>
-            <a:r>
-              <a:rPr b="1" lang="en-US" sz="2000" spc="-1" strike="noStrike">
-                <a:solidFill>
-                  <a:srgbClr val="000000"/>
-                </a:solidFill>
-                <a:latin typeface="Calibri"/>
-                <a:ea typeface="ＭＳ Ｐゴシック"/>
-              </a:rPr>
-              <a:t>- Ubuntu (20.04 Focal Fossa)</a:t>
-            </a:r>
-            <a:endParaRPr b="0" lang="en-CA" sz="2000" spc="-1" strike="noStrike">
-              <a:latin typeface="Arial"/>
-            </a:endParaRPr>
-          </a:p>
-          <a:p>
-            <a:pPr lvl="3" marL="864000" indent="-216000">
-              <a:lnSpc>
-                <a:spcPct val="150000"/>
-              </a:lnSpc>
-              <a:spcBef>
-                <a:spcPts val="479"/>
-              </a:spcBef>
-              <a:buClr>
-                <a:srgbClr val="000000"/>
-              </a:buClr>
-              <a:buSzPct val="45000"/>
-              <a:buFont typeface="Wingdings" charset="2"/>
-              <a:buChar char=""/>
-            </a:pPr>
-            <a:r>
-              <a:rPr b="1" lang="en-US" sz="2000" spc="-1" strike="noStrike">
-                <a:solidFill>
-                  <a:srgbClr val="000000"/>
-                </a:solidFill>
-                <a:latin typeface="Calibri"/>
-                <a:ea typeface="ＭＳ Ｐゴシック"/>
-              </a:rPr>
-              <a:t>- CentOS Stream 8 </a:t>
-            </a:r>
-            <a:endParaRPr b="0" lang="en-CA" sz="2000" spc="-1" strike="noStrike">
-              <a:latin typeface="Arial"/>
-            </a:endParaRPr>
-          </a:p>
-          <a:p>
-            <a:pPr marL="343080" indent="-342360">
+            <a:pPr marL="343080" indent="-341640">
               <a:lnSpc>
                 <a:spcPct val="150000"/>
               </a:lnSpc>
@@ -5128,21 +4968,61 @@
               <a:buChar char=""/>
             </a:pPr>
             <a:r>
-              <a:rPr b="1" lang="en-US" sz="2000" spc="-1" strike="noStrike">
+              <a:rPr b="0" lang="en-US" sz="2000" spc="-1" strike="noStrike">
                 <a:solidFill>
                   <a:srgbClr val="000000"/>
                 </a:solidFill>
-                <a:latin typeface="Calibri"/>
+                <a:latin typeface="FreeSerif"/>
                 <a:ea typeface="ＭＳ Ｐゴシック"/>
               </a:rPr>
-              <a:t>Docker CE </a:t>
+              <a:t>The labs have been tested with Debian 12, </a:t>
+            </a:r>
+            <a:r>
+              <a:rPr b="0" i="1" lang="en-US" sz="2000" spc="-1" strike="noStrike">
+                <a:solidFill>
+                  <a:srgbClr val="000000"/>
+                </a:solidFill>
+                <a:latin typeface="FreeSerif"/>
+                <a:ea typeface="ＭＳ Ｐゴシック"/>
+              </a:rPr>
+              <a:t>bookworm, </a:t>
+            </a:r>
+            <a:r>
+              <a:rPr b="0" lang="en-US" sz="2000" spc="-1" strike="noStrike">
+                <a:solidFill>
+                  <a:srgbClr val="000000"/>
+                </a:solidFill>
+                <a:latin typeface="FreeSerif"/>
+                <a:ea typeface="ＭＳ Ｐゴシック"/>
+              </a:rPr>
+              <a:t>using packages strictly from the Debian repositories.  A VirtualBox appliance is supplied containing a minimal </a:t>
+            </a:r>
+            <a:r>
+              <a:rPr b="0" i="1" lang="en-US" sz="2000" spc="-1" strike="noStrike">
+                <a:solidFill>
+                  <a:srgbClr val="000000"/>
+                </a:solidFill>
+                <a:latin typeface="FreeSerif"/>
+                <a:ea typeface="ＭＳ Ｐゴシック"/>
+              </a:rPr>
+              <a:t>bookworm</a:t>
+            </a:r>
+            <a:r>
+              <a:rPr b="0" lang="en-US" sz="2000" spc="-1" strike="noStrike">
+                <a:solidFill>
+                  <a:srgbClr val="000000"/>
+                </a:solidFill>
+                <a:latin typeface="FreeSerif"/>
+                <a:ea typeface="ＭＳ Ｐゴシック"/>
+              </a:rPr>
+              <a:t> VM.  </a:t>
             </a:r>
             <a:endParaRPr b="0" lang="en-CA" sz="2000" spc="-1" strike="noStrike">
               <a:latin typeface="Arial"/>
             </a:endParaRPr>
           </a:p>
           <a:p>
-            <a:pPr marL="343080" indent="-342360">
+            <a:pPr marL="343080" indent="-341640">
               <a:lnSpc>
                 <a:spcPct val="150000"/>
               </a:lnSpc>
@@ -5156,14 +5036,98 @@
               <a:buChar char=""/>
             </a:pPr>
             <a:r>
-              <a:rPr b="1" lang="en-US" sz="2000" spc="-1" strike="noStrike">
+              <a:rPr b="0" lang="en-US" sz="2000" spc="-1" strike="noStrike">
+                <a:solidFill>
+                  <a:srgbClr val="000000"/>
+                </a:solidFill>
+                <a:latin typeface="FreeSerif"/>
+                <a:ea typeface="ＭＳ Ｐゴシック"/>
+              </a:rPr>
+              <a:t> </a:t>
+            </a:r>
+            <a:endParaRPr b="0" lang="en-CA" sz="2000" spc="-1" strike="noStrike">
+              <a:latin typeface="Arial"/>
+            </a:endParaRPr>
+          </a:p>
+          <a:p>
+            <a:pPr marL="343080" indent="-341640">
+              <a:lnSpc>
+                <a:spcPct val="150000"/>
+              </a:lnSpc>
+              <a:spcBef>
+                <a:spcPts val="479"/>
+              </a:spcBef>
+              <a:buClr>
+                <a:srgbClr val="000000"/>
+              </a:buClr>
+              <a:buFont typeface="Symbol"/>
+              <a:buChar char=""/>
+            </a:pPr>
+            <a:r>
+              <a:rPr b="0" lang="en-US" sz="2000" spc="-1" strike="noStrike">
+                <a:solidFill>
+                  <a:srgbClr val="000000"/>
+                </a:solidFill>
+                <a:latin typeface="FreeSerif"/>
+                <a:ea typeface="ＭＳ Ｐゴシック"/>
+              </a:rPr>
+              <a:t>Adventurous students may make any substitutions they choose.</a:t>
+            </a:r>
+            <a:endParaRPr b="0" lang="en-CA" sz="2000" spc="-1" strike="noStrike">
+              <a:latin typeface="Arial"/>
+            </a:endParaRPr>
+          </a:p>
+          <a:p>
+            <a:pPr marL="343080" indent="-341640">
+              <a:lnSpc>
+                <a:spcPct val="150000"/>
+              </a:lnSpc>
+              <a:spcBef>
+                <a:spcPts val="479"/>
+              </a:spcBef>
+              <a:buClr>
+                <a:srgbClr val="000000"/>
+              </a:buClr>
+              <a:buFont typeface="Symbol"/>
+              <a:buChar char=""/>
+            </a:pPr>
+            <a:r>
+              <a:rPr b="0" lang="en-US" sz="2000" spc="-1" strike="noStrike">
                 <a:solidFill>
                   <a:srgbClr val="000000"/>
                 </a:solidFill>
                 <a:latin typeface="Calibri"/>
                 <a:ea typeface="ＭＳ Ｐゴシック"/>
               </a:rPr>
-              <a:t>VirtualBox (or your own VM environment)</a:t>
+              <a:t> </a:t>
+            </a:r>
+            <a:endParaRPr b="0" lang="en-CA" sz="2000" spc="-1" strike="noStrike">
+              <a:latin typeface="Arial"/>
+            </a:endParaRPr>
+          </a:p>
+          <a:p>
+            <a:pPr marL="343080" indent="-341640">
+              <a:lnSpc>
+                <a:spcPct val="150000"/>
+              </a:lnSpc>
+              <a:spcBef>
+                <a:spcPts val="479"/>
+              </a:spcBef>
+              <a:buClr>
+                <a:srgbClr val="000000"/>
+              </a:buClr>
+              <a:buFont typeface="Symbol"/>
+              <a:buChar char=""/>
+            </a:pPr>
+            <a:r>
+              <a:rPr b="0" lang="en-US" sz="2000" spc="-1" strike="noStrike">
+                <a:solidFill>
+                  <a:srgbClr val="000000"/>
+                </a:solidFill>
+                <a:latin typeface="Calibri"/>
+                <a:ea typeface="ＭＳ Ｐゴシック"/>
+              </a:rPr>
+              <a:t> </a:t>
             </a:r>
             <a:endParaRPr b="0" lang="en-CA" sz="2000" spc="-1" strike="noStrike">
               <a:latin typeface="Arial"/>
@@ -5210,7 +5174,7 @@
         <p:spPr>
           <a:xfrm>
             <a:off x="457200" y="274680"/>
-            <a:ext cx="8228880" cy="1142280"/>
+            <a:ext cx="8228160" cy="1141560"/>
           </a:xfrm>
           <a:prstGeom prst="rect">
             <a:avLst/>
@@ -5261,7 +5225,7 @@
         <p:spPr>
           <a:xfrm>
             <a:off x="1143000" y="1295280"/>
-            <a:ext cx="7619400" cy="3276000"/>
+            <a:ext cx="7618680" cy="3275280"/>
           </a:xfrm>
           <a:prstGeom prst="rect">
             <a:avLst/>
@@ -5282,7 +5246,7 @@
             <a:noAutofit/>
           </a:bodyPr>
           <a:p>
-            <a:pPr marL="343080" indent="-342360">
+            <a:pPr marL="343080" indent="-341640">
               <a:lnSpc>
                 <a:spcPct val="150000"/>
               </a:lnSpc>
@@ -5296,7 +5260,7 @@
               <a:buChar char=""/>
             </a:pPr>
             <a:r>
-              <a:rPr b="1" lang="en-US" sz="2400" spc="-1" strike="noStrike">
+              <a:rPr b="0" lang="en-US" sz="2400" spc="-1" strike="noStrike">
                 <a:solidFill>
                   <a:srgbClr val="000000"/>
                 </a:solidFill>
@@ -5310,7 +5274,7 @@
             </a:endParaRPr>
           </a:p>
           <a:p>
-            <a:pPr marL="343080" indent="-342360">
+            <a:pPr marL="343080" indent="-341640">
               <a:lnSpc>
                 <a:spcPct val="150000"/>
               </a:lnSpc>
@@ -5324,7 +5288,7 @@
               <a:buChar char=""/>
             </a:pPr>
             <a:r>
-              <a:rPr b="1" lang="en-US" sz="2000" spc="-1" strike="noStrike">
+              <a:rPr b="0" lang="en-US" sz="2000" spc="-1" strike="noStrike">
                 <a:solidFill>
                   <a:srgbClr val="000000"/>
                 </a:solidFill>
@@ -5338,7 +5302,7 @@
             </a:endParaRPr>
           </a:p>
           <a:p>
-            <a:pPr marL="343080" indent="-342360">
+            <a:pPr marL="343080" indent="-341640">
               <a:lnSpc>
                 <a:spcPct val="150000"/>
               </a:lnSpc>
@@ -5352,7 +5316,7 @@
               <a:buChar char=""/>
             </a:pPr>
             <a:r>
-              <a:rPr b="1" lang="en-US" sz="2000" spc="-1" strike="noStrike">
+              <a:rPr b="0" lang="en-US" sz="2000" spc="-1" strike="noStrike">
                 <a:solidFill>
                   <a:srgbClr val="000000"/>
                 </a:solidFill>
@@ -5419,7 +5383,7 @@
         <p:spPr>
           <a:xfrm>
             <a:off x="457200" y="274680"/>
-            <a:ext cx="8228880" cy="1142280"/>
+            <a:ext cx="8228160" cy="1141560"/>
           </a:xfrm>
           <a:prstGeom prst="rect">
             <a:avLst/>
@@ -5470,7 +5434,7 @@
         <p:spPr>
           <a:xfrm>
             <a:off x="999000" y="1296000"/>
-            <a:ext cx="6776640" cy="3961800"/>
+            <a:ext cx="6775920" cy="3961080"/>
           </a:xfrm>
           <a:prstGeom prst="rect">
             <a:avLst/>
@@ -5491,7 +5455,7 @@
             <a:noAutofit/>
           </a:bodyPr>
           <a:p>
-            <a:pPr marL="343080" indent="-342360">
+            <a:pPr marL="343080" indent="-341640">
               <a:lnSpc>
                 <a:spcPct val="150000"/>
               </a:lnSpc>
@@ -5512,14 +5476,14 @@
                 <a:latin typeface="Calibri"/>
                 <a:ea typeface="ＭＳ Ｐゴシック"/>
               </a:rPr>
-              <a:t>Application Containers (Docker)</a:t>
+              <a:t>Most week’s classes will start with a lecture or demonstration.  </a:t>
             </a:r>
             <a:endParaRPr b="0" lang="en-CA" sz="2000" spc="-1" strike="noStrike">
               <a:latin typeface="Arial"/>
             </a:endParaRPr>
           </a:p>
           <a:p>
-            <a:pPr marL="343080" indent="-342360">
+            <a:pPr marL="343080" indent="-341640">
               <a:lnSpc>
                 <a:spcPct val="150000"/>
               </a:lnSpc>
@@ -5540,35 +5504,7 @@
                 <a:latin typeface="Calibri"/>
                 <a:ea typeface="ＭＳ Ｐゴシック"/>
               </a:rPr>
-              <a:t>HA Clusters</a:t>
-            </a:r>
-            <a:endParaRPr b="0" lang="en-CA" sz="2000" spc="-1" strike="noStrike">
-              <a:latin typeface="Arial"/>
-            </a:endParaRPr>
-          </a:p>
-          <a:p>
-            <a:pPr marL="343080" indent="-342360">
-              <a:lnSpc>
-                <a:spcPct val="150000"/>
-              </a:lnSpc>
-              <a:spcBef>
-                <a:spcPts val="400"/>
-              </a:spcBef>
-              <a:buClr>
-                <a:srgbClr val="000000"/>
-              </a:buClr>
-              <a:buFont typeface="Symbol"/>
-              <a:buChar char=""/>
-            </a:pPr>
-            <a:r>
-              <a:rPr b="0" lang="en-US" sz="2000" spc="-1" strike="noStrike">
-                <a:solidFill>
-                  <a:srgbClr val="000000"/>
-                </a:solidFill>
-                <a:latin typeface="Calibri"/>
-                <a:ea typeface="ＭＳ Ｐゴシック"/>
-              </a:rPr>
-              <a:t>Application Deployment and Management</a:t>
+              <a:t>A pace of approximately one lab per week is recommended.</a:t>
             </a:r>
             <a:endParaRPr b="0" lang="en-CA" sz="2000" spc="-1" strike="noStrike">
               <a:latin typeface="Arial"/>
@@ -5628,7 +5564,7 @@
         <p:spPr>
           <a:xfrm>
             <a:off x="457200" y="274680"/>
-            <a:ext cx="8228880" cy="1142280"/>
+            <a:ext cx="8228160" cy="1141560"/>
           </a:xfrm>
           <a:prstGeom prst="rect">
             <a:avLst/>
@@ -5678,8 +5614,8 @@
         </p:nvSpPr>
         <p:spPr>
           <a:xfrm>
-            <a:off x="1143000" y="1295280"/>
-            <a:ext cx="7619400" cy="3961800"/>
+            <a:off x="1143000" y="2016000"/>
+            <a:ext cx="7618680" cy="3240360"/>
           </a:xfrm>
           <a:prstGeom prst="rect">
             <a:avLst/>
@@ -5700,7 +5636,7 @@
             <a:noAutofit/>
           </a:bodyPr>
           <a:p>
-            <a:pPr marL="343080" indent="-342360">
+            <a:pPr marL="343080" indent="-341640">
               <a:lnSpc>
                 <a:spcPct val="150000"/>
               </a:lnSpc>
@@ -5728,7 +5664,7 @@
             </a:endParaRPr>
           </a:p>
           <a:p>
-            <a:pPr marL="343080" indent="-342360">
+            <a:pPr marL="343080" indent="-341640">
               <a:lnSpc>
                 <a:spcPct val="150000"/>
               </a:lnSpc>
@@ -5752,119 +5688,6 @@
               <a:t>Apply the tools to exercises that simulate tasks you may face in a production environment</a:t>
             </a:r>
             <a:endParaRPr b="0" lang="en-CA" sz="2000" spc="-1" strike="noStrike">
-              <a:latin typeface="Arial"/>
-            </a:endParaRPr>
-          </a:p>
-        </p:txBody>
-      </p:sp>
-    </p:spTree>
-  </p:cSld>
-  <mc:AlternateContent>
-    <mc:Choice Requires="p14">
-      <p:transition spd="slow" p14:dur="2000"/>
-    </mc:Choice>
-    <mc:Fallback>
-      <p:transition spd="slow"/>
-    </mc:Fallback>
-  </mc:AlternateContent>
-</p:sld>
-</file>
-
-<file path=ppt/slides/slide8.xml><?xml version="1.0" encoding="utf-8"?>
-<p:sld xmlns:a="http://schemas.openxmlformats.org/drawingml/2006/main" xmlns:p="http://schemas.openxmlformats.org/presentationml/2006/main" xmlns:r="http://schemas.openxmlformats.org/officeDocument/2006/relationships" xmlns:p14="http://schemas.microsoft.com/office/powerpoint/2010/main" xmlns:p15="http://schemas.microsoft.com/office/powerpoint/2012/main" xmlns:mc="http://schemas.openxmlformats.org/markup-compatibility/2006">
-  <p:cSld>
-    <p:spTree>
-      <p:nvGrpSpPr>
-        <p:cNvPr id="1" name=""/>
-        <p:cNvGrpSpPr/>
-        <p:nvPr/>
-      </p:nvGrpSpPr>
-      <p:grpSpPr>
-        <a:xfrm>
-          <a:off x="0" y="0"/>
-          <a:ext cx="0" cy="0"/>
-          <a:chOff x="0" y="0"/>
-          <a:chExt cx="0" cy="0"/>
-        </a:xfrm>
-      </p:grpSpPr>
-      <p:sp>
-        <p:nvSpPr>
-          <p:cNvPr id="99" name="CustomShape 1"/>
-          <p:cNvSpPr/>
-          <p:nvPr/>
-        </p:nvSpPr>
-        <p:spPr>
-          <a:xfrm>
-            <a:off x="457200" y="274680"/>
-            <a:ext cx="8228880" cy="1142280"/>
-          </a:xfrm>
-          <a:prstGeom prst="rect">
-            <a:avLst/>
-          </a:prstGeom>
-          <a:noFill/>
-          <a:ln>
-            <a:noFill/>
-          </a:ln>
-        </p:spPr>
-        <p:style>
-          <a:lnRef idx="0"/>
-          <a:fillRef idx="0"/>
-          <a:effectRef idx="0"/>
-          <a:fontRef idx="minor"/>
-        </p:style>
-      </p:sp>
-      <p:sp>
-        <p:nvSpPr>
-          <p:cNvPr id="100" name="CustomShape 2"/>
-          <p:cNvSpPr/>
-          <p:nvPr/>
-        </p:nvSpPr>
-        <p:spPr>
-          <a:xfrm>
-            <a:off x="1143000" y="1676520"/>
-            <a:ext cx="7619400" cy="3580560"/>
-          </a:xfrm>
-          <a:prstGeom prst="rect">
-            <a:avLst/>
-          </a:prstGeom>
-          <a:noFill/>
-          <a:ln>
-            <a:noFill/>
-          </a:ln>
-        </p:spPr>
-        <p:style>
-          <a:lnRef idx="0"/>
-          <a:fillRef idx="0"/>
-          <a:effectRef idx="0"/>
-          <a:fontRef idx="minor"/>
-        </p:style>
-        <p:txBody>
-          <a:bodyPr lIns="90000" rIns="90000" tIns="45000" bIns="45000">
-            <a:noAutofit/>
-          </a:bodyPr>
-          <a:p>
-            <a:pPr>
-              <a:lnSpc>
-                <a:spcPct val="150000"/>
-              </a:lnSpc>
-              <a:spcBef>
-                <a:spcPts val="641"/>
-              </a:spcBef>
-              <a:tabLst>
-                <a:tab algn="l" pos="0"/>
-              </a:tabLst>
-            </a:pPr>
-            <a:r>
-              <a:rPr b="1" i="1" lang="en-US" sz="3200" spc="-1" strike="noStrike">
-                <a:solidFill>
-                  <a:srgbClr val="000000"/>
-                </a:solidFill>
-                <a:latin typeface="Calibri"/>
-                <a:ea typeface="ＭＳ Ｐゴシック"/>
-              </a:rPr>
-              <a:t>Let’s build some cool stuff!</a:t>
-            </a:r>
-            <a:endParaRPr b="0" lang="en-CA" sz="3200" spc="-1" strike="noStrike">
               <a:latin typeface="Arial"/>
             </a:endParaRPr>
           </a:p>

</xml_diff>